<commit_message>
modif responsive page acceuil
</commit_message>
<xml_diff>
--- a/maquette/Maquette légendé.pptx
+++ b/maquette/Maquette légendé.pptx
@@ -299,7 +299,7 @@
           <a:p>
             <a:fld id="{5743F934-070A-43EC-AE8F-B6C9C1B9CF04}" type="datetimeFigureOut">
               <a:rPr lang="fr-FR" smtClean="0"/>
-              <a:t>26/03/2021</a:t>
+              <a:t>29/03/2021</a:t>
             </a:fld>
             <a:endParaRPr lang="fr-FR"/>
           </a:p>
@@ -497,7 +497,7 @@
           <a:p>
             <a:fld id="{5743F934-070A-43EC-AE8F-B6C9C1B9CF04}" type="datetimeFigureOut">
               <a:rPr lang="fr-FR" smtClean="0"/>
-              <a:t>26/03/2021</a:t>
+              <a:t>29/03/2021</a:t>
             </a:fld>
             <a:endParaRPr lang="fr-FR"/>
           </a:p>
@@ -705,7 +705,7 @@
           <a:p>
             <a:fld id="{5743F934-070A-43EC-AE8F-B6C9C1B9CF04}" type="datetimeFigureOut">
               <a:rPr lang="fr-FR" smtClean="0"/>
-              <a:t>26/03/2021</a:t>
+              <a:t>29/03/2021</a:t>
             </a:fld>
             <a:endParaRPr lang="fr-FR"/>
           </a:p>
@@ -1090,7 +1090,7 @@
           <a:p>
             <a:fld id="{5743F934-070A-43EC-AE8F-B6C9C1B9CF04}" type="datetimeFigureOut">
               <a:rPr lang="fr-FR" smtClean="0"/>
-              <a:t>26/03/2021</a:t>
+              <a:t>29/03/2021</a:t>
             </a:fld>
             <a:endParaRPr lang="fr-FR"/>
           </a:p>
@@ -1365,7 +1365,7 @@
           <a:p>
             <a:fld id="{5743F934-070A-43EC-AE8F-B6C9C1B9CF04}" type="datetimeFigureOut">
               <a:rPr lang="fr-FR" smtClean="0"/>
-              <a:t>26/03/2021</a:t>
+              <a:t>29/03/2021</a:t>
             </a:fld>
             <a:endParaRPr lang="fr-FR"/>
           </a:p>
@@ -1630,7 +1630,7 @@
           <a:p>
             <a:fld id="{5743F934-070A-43EC-AE8F-B6C9C1B9CF04}" type="datetimeFigureOut">
               <a:rPr lang="fr-FR" smtClean="0"/>
-              <a:t>26/03/2021</a:t>
+              <a:t>29/03/2021</a:t>
             </a:fld>
             <a:endParaRPr lang="fr-FR"/>
           </a:p>
@@ -2042,7 +2042,7 @@
           <a:p>
             <a:fld id="{5743F934-070A-43EC-AE8F-B6C9C1B9CF04}" type="datetimeFigureOut">
               <a:rPr lang="fr-FR" smtClean="0"/>
-              <a:t>26/03/2021</a:t>
+              <a:t>29/03/2021</a:t>
             </a:fld>
             <a:endParaRPr lang="fr-FR"/>
           </a:p>
@@ -2183,7 +2183,7 @@
           <a:p>
             <a:fld id="{5743F934-070A-43EC-AE8F-B6C9C1B9CF04}" type="datetimeFigureOut">
               <a:rPr lang="fr-FR" smtClean="0"/>
-              <a:t>26/03/2021</a:t>
+              <a:t>29/03/2021</a:t>
             </a:fld>
             <a:endParaRPr lang="fr-FR"/>
           </a:p>
@@ -2296,7 +2296,7 @@
           <a:p>
             <a:fld id="{5743F934-070A-43EC-AE8F-B6C9C1B9CF04}" type="datetimeFigureOut">
               <a:rPr lang="fr-FR" smtClean="0"/>
-              <a:t>26/03/2021</a:t>
+              <a:t>29/03/2021</a:t>
             </a:fld>
             <a:endParaRPr lang="fr-FR"/>
           </a:p>
@@ -2607,7 +2607,7 @@
           <a:p>
             <a:fld id="{5743F934-070A-43EC-AE8F-B6C9C1B9CF04}" type="datetimeFigureOut">
               <a:rPr lang="fr-FR" smtClean="0"/>
-              <a:t>26/03/2021</a:t>
+              <a:t>29/03/2021</a:t>
             </a:fld>
             <a:endParaRPr lang="fr-FR"/>
           </a:p>
@@ -2895,7 +2895,7 @@
           <a:p>
             <a:fld id="{5743F934-070A-43EC-AE8F-B6C9C1B9CF04}" type="datetimeFigureOut">
               <a:rPr lang="fr-FR" smtClean="0"/>
-              <a:t>26/03/2021</a:t>
+              <a:t>29/03/2021</a:t>
             </a:fld>
             <a:endParaRPr lang="fr-FR"/>
           </a:p>
@@ -3136,7 +3136,7 @@
           <a:p>
             <a:fld id="{5743F934-070A-43EC-AE8F-B6C9C1B9CF04}" type="datetimeFigureOut">
               <a:rPr lang="fr-FR" smtClean="0"/>
-              <a:t>26/03/2021</a:t>
+              <a:t>29/03/2021</a:t>
             </a:fld>
             <a:endParaRPr lang="fr-FR"/>
           </a:p>

</xml_diff>